<commit_message>
Subindo imagens do bi
</commit_message>
<xml_diff>
--- a/Financial/Presentation_Financial_report.pptx
+++ b/Financial/Presentation_Financial_report.pptx
@@ -117,7 +117,7 @@
 <file path=ppt/revisionInfo.xml><?xml version="1.0" encoding="utf-8"?>
 <p1510:revInfo xmlns:a="http://schemas.openxmlformats.org/drawingml/2006/main" xmlns:r="http://schemas.openxmlformats.org/officeDocument/2006/relationships" xmlns:p1510="http://schemas.microsoft.com/office/powerpoint/2015/10/main">
   <p1510:revLst>
-    <p1510:client id="{1D75D7FB-360F-4999-B590-C3E12B691E37}" v="12" dt="2023-10-18T01:10:26.745"/>
+    <p1510:client id="{1D75D7FB-360F-4999-B590-C3E12B691E37}" v="19" dt="2023-10-18T02:05:18.757"/>
   </p1510:revLst>
 </p1510:revInfo>
 </file>
@@ -4199,7 +4199,7 @@
   </we:alternateReferences>
   <we:properties>
     <we:property name="backgroundColor" value="&quot;#FFFFFF&quot;"/>
-    <we:property name="bookmark" value="&quot;H4sIAAAAAAAAA+1XS08bMRD+K2gvXCIUJ5sXN0jppQ9FBCFVKIeJPbsYHHtreykp4r937M0CoQlppUCK1Js9MzvzeeYbj/cuEdIVCuZfYYbJYXJszPUM7PUeSxqJXpbxftrFlDWhzVmrzVqDVtYlK1N4abRLDu8SDzZHfy5dCSo4JOHFpJGAUiPIwy4D5bCRFGid0aDkT6yMSeVtifeNBG8LZSwEl2MPHoPbGzKnPUFhB22KCNzLGxwj95X0FAtjfb1vJK5aRUjLuuAsBhwa7UFqchxkrWmXgcgYh+Yg6wnBYdAJ8kwqvzCZzk9uC0vnoVPOi5CWI3EDmqNIImiLzi0iHOW5xRzqgCdLyqFR5WyFfGxKy/EUs6jSXvo5xcikphgyJOiekjOyhlIXNXtjUFhJP5Z6cbpm2F6aH0OLlDoRBI0HvEMS5cZKDuo3yNtCNcZ8htonu8bxhcp7uXMU3xDsChATkjipc7Ug/yMrzypsXJWOeIeiAjK8BOtDo02viMaBjeTAWIH2eB4J+UHamt+s8Up8qzMaUvgW8Ra5u5/U7U66qyd9vahflYCt02br55iEzCXQnmZN7HX6rItsIDqs34T3eM+wXXcWLUXJV90zG5vLeeDXKI7ok79prNZzou80+2/bFo/ZrmjMRTYQogs9Nu2KNO21eK+/kcY7vHD/jdmzmZlKcrRLfExmSC+qsBDgIaazqCJJrPRGRDXGbN8lnyVVoPJ9DqoMbvePwUm+Hy7TWMA1zInmbqu8qcux/dxOqpciaFe/Eyvk1qi4qk9DbaLwBlWl/V6inVOwaPEY5CDiJFPpCKeCwoWChfcoiQRGVJ9w/iq5iVFHUus6ZMjWOpzx9Hvxpb4G7bIrMrLG+ICoPkddZV0qRY18KZWwqOPJnptcrGZTq8nS/Rr5mcmJz0+g/7mT9honk5qkzW4foQMpg5R+NNIUO93g48UW8njrp+Z2+U4P3gTrsX7KMhhMW8Bp9mb9/y/8N568hcR3OnGbu524kcGrhoIpvSuA4wg0rhgO8YYUoTovDoj4Ux6f9qFecqo2TZSHDxbwfgGgdr+gRRAAAA==&quot;"/>
+    <we:property name="bookmark" value="&quot;H4sIAAAAAAAAA+1X32/aMBD+V6q89AVVGEKAvrWse9kPoVJNmioeLvEluDVxZjsMVvG/7+yQtrTQbh2jq7S35O5y9/nzZ9/lJuDCFBIWn2GKwXFwqtT1FPT1AQsaQb5ua7Nm3Ol3eixuI2Irgna/Q1GqsELlJji+CSzoDO0XYUqQLiEZL8eNAKQcQubeUpAGG0GB2qgcpPiBVTC5rC5x2QhwXkilwaUcWbDo0s4onN4JCjtqU0VIrJjhCBNbWc+xUNrW743AVE8e0rrPJfMFByq3IHJK7GycdVkvZCn04xYkrM/TXsfZUyHtKiRenM0LTeuhVS4KR8sJn0GeIA88aI3GrCqcZJnGDOqCZ2vOgZLldIN9pEqd4Dmm3pVbYRdUIxU51RCOoCWRM9SKqPOegxFIrKzvy3y1uqZ7najvA41EHXeGxi3eAZkypUUC8hHkXaGiR14mNniMY0wWI/JMrnb8bisuKniFwMEEtHWKiq9ovxzt9JHSHPXpwjP/Tuh6I1uNB1BflfXluFYlBV/dk9+K9Ar+7lkeL50LmlEPoQMhg7CVRmGIncilepJvi3Mbq/k63S5bwtM+5xF0WRzxMOy2km7v2cOwD3F9RdAblLVfhX+ii2PyEn0bKRLUa3QHU6T70l9AYMHTWVSVBFZ+xb0bPds3wUdBO1Dl/gKydGkPT8GI5JAQLb0ctujQh5udqrDejt1zO676AOSm7gIVcq2kf6pXQ4dO4gxl5f1Wol5QMR9xV+TI46RQYQinhMK4DXPdhkwcPaoPuPgr3PiqQ5HndUnH1jacfvUHvg9vQbueioK0UtYhqtdR73JeSkkHeSIk15j7lT0MudysplaThYc18guVkZ7vQf/1JO0tSca1SNtx2sQuDRMRUr/tsF4T3mLHZa99H/1BxzUWkmvkJ/TJG+287LU7byuOGPCUJdDsp13OE+j/HxxfgmqE2ZTuln+2ve8XxZZJ59kTncjSkO6QV0B+51Szh6d614w6CvdRb8Xdfu+FW9nsfoTwg91y89ioSmsKSHAIOW4YH/0MxZ12nhwh/U+53yGnJhHL52bO2w9W8H4CT4zTUUUQAAA=&quot;"/>
     <we:property name="creatorSessionId" value="&quot;8bce2f03-8e13-4e6a-8047-41f12ec0abdd&quot;"/>
     <we:property name="creatorTenantId" value="&quot;131ce1a7-2be9-4bb9-be38-9caecd07110e&quot;"/>
     <we:property name="creatorUserId" value="&quot;10032003063CD287&quot;"/>
@@ -4236,13 +4236,13 @@
     <we:property name="embedUrl" value="&quot;/reportEmbed?reportId=4d79084a-6830-43c3-8e87-8293feec53ad&amp;config=eyJjbHVzdGVyVXJsIjoiaHR0cHM6Ly9XQUJJLUJSQVpJTC1TT1VUSC1CLVBSSU1BUlktcmVkaXJlY3QuYW5hbHlzaXMud2luZG93cy5uZXQiLCJlbWJlZEZlYXR1cmVzIjp7InVzYWdlTWV0cmljc1ZOZXh0Ijp0cnVlfX0%3D&amp;disableSensitivityBanner=true&quot;"/>
     <we:property name="initialStateBookmark" value="&quot;H4sIAAAAAAAAA+1XTW/bMAz9K4XOwWA7iWz3lmTdpesHmq3AMAQDLdGpWscyZLlLVuS/j5IddO26BSm6NoedLJES+Ug+StYdk6quClidwgLZIRtrfbMAc3MQsh4rO9nZ2fHJ6OL42+no5IjEurJKlzU7vGMWzBztpaobKJwFEn6d9RgUxTnM3SyHosYeq9DUuoRC/cB2MamsaXDdY7isCm3AmZxasOjM3tJympPv8F2fPIKw6hanKGwrvcBKG9vNE5EEAjMep3GayzwciABpT91qPczt651TD2yiSwuqJABOJsM8l0nAw34y5EGQDFIeOXmtynnRhXK/99OqcvmyuLSZXrpMZdfk01larynUPopBFkQBymQQpTFPUtnfag086HFjLYX+m8lAxmKQZ3EURX0ZowgxB2ciV4XtYshWR8vKUGGoXK3JkbyFUqBkPvsG6zbZd2w0nxucg+2mRw+UE100iyfkU90YgReYe1VplV2Rj1yV5EO5Sjuc50YTB7zmYAoFttIPTdmVNHDTK/19YpA4IJ2gtyd4P5fK1gdTXcjtmGck+Ws1BRjZqR7UkiZGohmvfJ3eK7PhetR7BP9Na0QBkoiHwyAaDiLOeZYkURwGYb7npKNhruwupJuQaK6NEr5U+E9QTXRTWrNizyBSpXByBcbuNY3+lPX1bHOm04rrXw7qLukt/JfP8syfmVkYImCY9sOMrgGIch7J//R9BqovCOYJ7r4uiBO6sK+e00HCA9ilicLHTfTCiXSZew13m5S9bhtu2PLycbRt3Y84Ch5nw4BDCsCTHPiet/Xuv0J7fivt3lP79n/zdheTJ/F9ytgC6W3lBrqxdQUCz6FE779qTSj064gEUEqU3di470dFlG/rcwlF40rjX2L+kHElU1mBWza49xnzsDy6n5zaAgUqDgAA&quot;"/>
     <we:property name="isFiltersActionButtonVisible" value="true"/>
+    <we:property name="isFooterCollapsed" value="true"/>
     <we:property name="pageDisplayName" value="&quot;Page 2&quot;"/>
     <we:property name="pageName" value="&quot;ReportSection8c80ceb67979fdf14c0e&quot;"/>
     <we:property name="reportEmbeddedTime" value="&quot;2023-10-17T02:32:08.884Z&quot;"/>
     <we:property name="reportName" value="&quot;first_project&quot;"/>
     <we:property name="reportState" value="&quot;CONNECTED&quot;"/>
     <we:property name="reportUrl" value="&quot;/groups/me/reports/4d79084a-6830-43c3-8e87-8293feec53ad/ReportSection8c80ceb67979fdf14c0e?bookmarkGuid=1102a3ef-86b6-4219-b33a-585f94f49a0d&amp;bookmarkUsage=1&amp;ctid=131ce1a7-2be9-4bb9-be38-9caecd07110e&amp;fromEntryPoint=export&quot;"/>
-    <we:property name="isFooterCollapsed" value="true"/>
   </we:properties>
   <we:bindings/>
   <we:snapshot xmlns:r="http://schemas.openxmlformats.org/officeDocument/2006/relationships" r:embed="rId1"/>
@@ -4266,13 +4266,13 @@
     <we:property name="embedUrl" value="&quot;/reportEmbed?reportId=4d79084a-6830-43c3-8e87-8293feec53ad&amp;config=eyJjbHVzdGVyVXJsIjoiaHR0cHM6Ly9XQUJJLUJSQVpJTC1TT1VUSC1CLVBSSU1BUlktcmVkaXJlY3QuYW5hbHlzaXMud2luZG93cy5uZXQiLCJlbWJlZEZlYXR1cmVzIjp7InVzYWdlTWV0cmljc1ZOZXh0Ijp0cnVlfX0%3D&amp;disableSensitivityBanner=true&quot;"/>
     <we:property name="initialStateBookmark" value="&quot;H4sIAAAAAAAAA+1Wy27bMBD8lYBno5BflJ2b47qXNIlhtbkERrGSlgoTmhQoyrVr+N+7pJTm0SDuIUiKorqIO0txZ4cjiTuWy6pUsD2HFbJjdmLM7Qrs7VGXdZhusYuL07PJ4vTb+eRsRrApnTS6Ysc75sAW6C5lVYPyKxB4tewwUGoOhY8EqAo7rERbGQ1K/sBmMqWcrXHfYbgplbHgl0wcOPTLrmk6xVS7+6FPFSFzco0JZq5BF1ga69qY8+6omw7iKI6j/jDvjiCL6ZmqyQaah+f7ooHY1GgHUhMBj/FoDL1+j2M2zEYpIopBICikcu2UdDvblJb6JjW2pddrkq9BZ5iz0JzFqullxyZFYbEA14azR8mpUfXqGTwxtc1wgSKktJNuSzWE1FRDeiH3JOLcGpI4ZI4SUNign2rdKhb58Np8n1okiXMPdH7xnRJUGCszUL9Rfi1WU1NrZ7fsJR7vq9tXLV11lBiVH9ZuSUgldaFaN9/b50vTygpK/6KkN2Q575L9nYep4M0DY7bSb4N9Xl/r5d6nBl1Bzh3wiPNRNszTiI/jgyb+bwqfoaGQ7l8zhBBZlHIQcYRjwTlgH+Av/6r96Ua87VctwWKF2j1j4IOGKCVOr8G6p64wNkd70uz/R2nvfnm9zhOq76r6fvmW9r1XubFvT0Qi5v1YCMEh76U9GA/9Ui/q7XDjUrN5LHe4HiJshXSg8QNTu6qEDOegMXRTNoQkhnnkJ9C53+swtv7+WdLb05S+BFX7quH4w0IRYiNThQce8IciFmj5Xvc/Aajai4ifCQAA&quot;"/>
     <we:property name="isFiltersActionButtonVisible" value="true"/>
+    <we:property name="isFooterCollapsed" value="true"/>
     <we:property name="pageDisplayName" value="&quot;Page 3&quot;"/>
     <we:property name="pageName" value="&quot;ReportSection66181b47077035d18ac7&quot;"/>
     <we:property name="reportEmbeddedTime" value="&quot;2023-10-17T02:30:25.846Z&quot;"/>
     <we:property name="reportName" value="&quot;first_project&quot;"/>
     <we:property name="reportState" value="&quot;CONNECTED&quot;"/>
     <we:property name="reportUrl" value="&quot;/groups/me/reports/4d79084a-6830-43c3-8e87-8293feec53ad/ReportSection66181b47077035d18ac7?bookmarkGuid=d7765799-484e-4c52-b9f2-6204256864de&amp;bookmarkUsage=1&amp;ctid=131ce1a7-2be9-4bb9-be38-9caecd07110e&amp;fromEntryPoint=export&quot;"/>
-    <we:property name="isFooterCollapsed" value="true"/>
   </we:properties>
   <we:bindings/>
   <we:snapshot xmlns:r="http://schemas.openxmlformats.org/officeDocument/2006/relationships" r:embed="rId1"/>

</xml_diff>